<commit_message>
ajout url public databricks et debut relecture conv rate challenge
</commit_message>
<xml_diff>
--- a/03_data_collection/99_Project_Kayak/kayak_project.pptx
+++ b/03_data_collection/99_Project_Kayak/kayak_project.pptx
@@ -5,7 +5,7 @@
     <p:sldMasterId id="2147483660" r:id="rId1"/>
   </p:sldMasterIdLst>
   <p:notesMasterIdLst>
-    <p:notesMasterId r:id="rId8"/>
+    <p:notesMasterId r:id="rId9"/>
   </p:notesMasterIdLst>
   <p:sldIdLst>
     <p:sldId id="256" r:id="rId2"/>
@@ -13,7 +13,8 @@
     <p:sldId id="259" r:id="rId4"/>
     <p:sldId id="260" r:id="rId5"/>
     <p:sldId id="261" r:id="rId6"/>
-    <p:sldId id="257" r:id="rId7"/>
+    <p:sldId id="263" r:id="rId7"/>
+    <p:sldId id="257" r:id="rId8"/>
   </p:sldIdLst>
   <p:sldSz cx="12192000" cy="6858000"/>
   <p:notesSz cx="6858000" cy="9144000"/>
@@ -120,12 +121,20 @@
 </p:presentation>
 </file>
 
+<file path=ppt/revisionInfo.xml><?xml version="1.0" encoding="utf-8"?>
+<p1510:revInfo xmlns:a="http://schemas.openxmlformats.org/drawingml/2006/main" xmlns:r="http://schemas.openxmlformats.org/officeDocument/2006/relationships" xmlns:p1510="http://schemas.microsoft.com/office/powerpoint/2015/10/main">
+  <p1510:revLst>
+    <p1510:client id="{1527D352-431F-46B2-B7FF-4AE38ADEBEBC}" v="1" dt="2024-08-22T08:02:24.384"/>
+  </p1510:revLst>
+</p1510:revInfo>
+</file>
+
 <file path=ppt/changesInfos/changesInfo1.xml><?xml version="1.0" encoding="utf-8"?>
 <pc:chgInfo xmlns:a="http://schemas.openxmlformats.org/drawingml/2006/main" xmlns:r="http://schemas.openxmlformats.org/officeDocument/2006/relationships" xmlns:ac="http://schemas.microsoft.com/office/drawing/2013/main/command" xmlns:pc="http://schemas.microsoft.com/office/powerpoint/2013/main/command">
   <pc:docChgLst>
     <pc:chgData name="Philippe Baucour" userId="5102170ae7533958" providerId="LiveId" clId="{1527D352-431F-46B2-B7FF-4AE38ADEBEBC}"/>
-    <pc:docChg chg="modSld">
-      <pc:chgData name="Philippe Baucour" userId="5102170ae7533958" providerId="LiveId" clId="{1527D352-431F-46B2-B7FF-4AE38ADEBEBC}" dt="2024-08-20T13:32:14.809" v="75" actId="1036"/>
+    <pc:docChg chg="addSld modSld">
+      <pc:chgData name="Philippe Baucour" userId="5102170ae7533958" providerId="LiveId" clId="{1527D352-431F-46B2-B7FF-4AE38ADEBEBC}" dt="2024-08-22T08:05:03.115" v="80" actId="20577"/>
       <pc:docMkLst>
         <pc:docMk/>
       </pc:docMkLst>
@@ -167,6 +176,21 @@
           </ac:picMkLst>
         </pc:picChg>
       </pc:sldChg>
+      <pc:sldChg chg="modSp add mod">
+        <pc:chgData name="Philippe Baucour" userId="5102170ae7533958" providerId="LiveId" clId="{1527D352-431F-46B2-B7FF-4AE38ADEBEBC}" dt="2024-08-22T08:05:03.115" v="80" actId="20577"/>
+        <pc:sldMkLst>
+          <pc:docMk/>
+          <pc:sldMk cId="312535264" sldId="263"/>
+        </pc:sldMkLst>
+        <pc:spChg chg="mod">
+          <ac:chgData name="Philippe Baucour" userId="5102170ae7533958" providerId="LiveId" clId="{1527D352-431F-46B2-B7FF-4AE38ADEBEBC}" dt="2024-08-22T08:05:03.115" v="80" actId="20577"/>
+          <ac:spMkLst>
+            <pc:docMk/>
+            <pc:sldMk cId="312535264" sldId="263"/>
+            <ac:spMk id="4" creationId="{80E590DF-0A88-7056-85D1-A8E809E2318F}"/>
+          </ac:spMkLst>
+        </pc:spChg>
+      </pc:sldChg>
     </pc:docChg>
   </pc:docChgLst>
 </pc:chgInfo>
@@ -254,7 +278,7 @@
           <a:p>
             <a:fld id="{FD1752CD-A7D2-4825-BC26-9DAEFBD0A5FF}" type="datetimeFigureOut">
               <a:rPr lang="fr-FR" smtClean="0"/>
-              <a:t>20/08/2024</a:t>
+              <a:t>22/08/2024</a:t>
             </a:fld>
             <a:endParaRPr lang="fr-FR"/>
           </a:p>
@@ -1667,7 +1691,7 @@
           <a:p>
             <a:fld id="{7ECB9D5A-E5E4-41FE-AF39-634902D6D5D2}" type="datetimeFigureOut">
               <a:rPr lang="fr-FR" smtClean="0"/>
-              <a:t>20/08/2024</a:t>
+              <a:t>22/08/2024</a:t>
             </a:fld>
             <a:endParaRPr lang="fr-FR"/>
           </a:p>
@@ -1865,7 +1889,7 @@
           <a:p>
             <a:fld id="{7ECB9D5A-E5E4-41FE-AF39-634902D6D5D2}" type="datetimeFigureOut">
               <a:rPr lang="fr-FR" smtClean="0"/>
-              <a:t>20/08/2024</a:t>
+              <a:t>22/08/2024</a:t>
             </a:fld>
             <a:endParaRPr lang="fr-FR"/>
           </a:p>
@@ -2073,7 +2097,7 @@
           <a:p>
             <a:fld id="{7ECB9D5A-E5E4-41FE-AF39-634902D6D5D2}" type="datetimeFigureOut">
               <a:rPr lang="fr-FR" smtClean="0"/>
-              <a:t>20/08/2024</a:t>
+              <a:t>22/08/2024</a:t>
             </a:fld>
             <a:endParaRPr lang="fr-FR"/>
           </a:p>
@@ -2271,7 +2295,7 @@
           <a:p>
             <a:fld id="{7ECB9D5A-E5E4-41FE-AF39-634902D6D5D2}" type="datetimeFigureOut">
               <a:rPr lang="fr-FR" smtClean="0"/>
-              <a:t>20/08/2024</a:t>
+              <a:t>22/08/2024</a:t>
             </a:fld>
             <a:endParaRPr lang="fr-FR"/>
           </a:p>
@@ -2546,7 +2570,7 @@
           <a:p>
             <a:fld id="{7ECB9D5A-E5E4-41FE-AF39-634902D6D5D2}" type="datetimeFigureOut">
               <a:rPr lang="fr-FR" smtClean="0"/>
-              <a:t>20/08/2024</a:t>
+              <a:t>22/08/2024</a:t>
             </a:fld>
             <a:endParaRPr lang="fr-FR"/>
           </a:p>
@@ -2811,7 +2835,7 @@
           <a:p>
             <a:fld id="{7ECB9D5A-E5E4-41FE-AF39-634902D6D5D2}" type="datetimeFigureOut">
               <a:rPr lang="fr-FR" smtClean="0"/>
-              <a:t>20/08/2024</a:t>
+              <a:t>22/08/2024</a:t>
             </a:fld>
             <a:endParaRPr lang="fr-FR"/>
           </a:p>
@@ -3223,7 +3247,7 @@
           <a:p>
             <a:fld id="{7ECB9D5A-E5E4-41FE-AF39-634902D6D5D2}" type="datetimeFigureOut">
               <a:rPr lang="fr-FR" smtClean="0"/>
-              <a:t>20/08/2024</a:t>
+              <a:t>22/08/2024</a:t>
             </a:fld>
             <a:endParaRPr lang="fr-FR"/>
           </a:p>
@@ -3364,7 +3388,7 @@
           <a:p>
             <a:fld id="{7ECB9D5A-E5E4-41FE-AF39-634902D6D5D2}" type="datetimeFigureOut">
               <a:rPr lang="fr-FR" smtClean="0"/>
-              <a:t>20/08/2024</a:t>
+              <a:t>22/08/2024</a:t>
             </a:fld>
             <a:endParaRPr lang="fr-FR"/>
           </a:p>
@@ -3477,7 +3501,7 @@
           <a:p>
             <a:fld id="{7ECB9D5A-E5E4-41FE-AF39-634902D6D5D2}" type="datetimeFigureOut">
               <a:rPr lang="fr-FR" smtClean="0"/>
-              <a:t>20/08/2024</a:t>
+              <a:t>22/08/2024</a:t>
             </a:fld>
             <a:endParaRPr lang="fr-FR"/>
           </a:p>
@@ -3788,7 +3812,7 @@
           <a:p>
             <a:fld id="{7ECB9D5A-E5E4-41FE-AF39-634902D6D5D2}" type="datetimeFigureOut">
               <a:rPr lang="fr-FR" smtClean="0"/>
-              <a:t>20/08/2024</a:t>
+              <a:t>22/08/2024</a:t>
             </a:fld>
             <a:endParaRPr lang="fr-FR"/>
           </a:p>
@@ -4079,7 +4103,7 @@
           <a:p>
             <a:fld id="{7ECB9D5A-E5E4-41FE-AF39-634902D6D5D2}" type="datetimeFigureOut">
               <a:rPr lang="fr-FR" smtClean="0"/>
-              <a:t>20/08/2024</a:t>
+              <a:t>22/08/2024</a:t>
             </a:fld>
             <a:endParaRPr lang="fr-FR"/>
           </a:p>
@@ -4320,7 +4344,7 @@
           <a:p>
             <a:fld id="{7ECB9D5A-E5E4-41FE-AF39-634902D6D5D2}" type="datetimeFigureOut">
               <a:rPr lang="fr-FR" smtClean="0"/>
-              <a:t>20/08/2024</a:t>
+              <a:t>22/08/2024</a:t>
             </a:fld>
             <a:endParaRPr lang="fr-FR"/>
           </a:p>
@@ -5923,6 +5947,100 @@
 </file>
 
 <file path=ppt/slides/slide6.xml><?xml version="1.0" encoding="utf-8"?>
+<p:sld xmlns:a="http://schemas.openxmlformats.org/drawingml/2006/main" xmlns:r="http://schemas.openxmlformats.org/officeDocument/2006/relationships" xmlns:p="http://schemas.openxmlformats.org/presentationml/2006/main">
+  <p:cSld>
+    <p:spTree>
+      <p:nvGrpSpPr>
+        <p:cNvPr id="1" name=""/>
+        <p:cNvGrpSpPr/>
+        <p:nvPr/>
+      </p:nvGrpSpPr>
+      <p:grpSpPr>
+        <a:xfrm>
+          <a:off x="0" y="0"/>
+          <a:ext cx="0" cy="0"/>
+          <a:chOff x="0" y="0"/>
+          <a:chExt cx="0" cy="0"/>
+        </a:xfrm>
+      </p:grpSpPr>
+      <p:sp>
+        <p:nvSpPr>
+          <p:cNvPr id="4" name="Titre 3">
+            <a:extLst>
+              <a:ext uri="{FF2B5EF4-FFF2-40B4-BE49-F238E27FC236}">
+                <a16:creationId xmlns:a16="http://schemas.microsoft.com/office/drawing/2014/main" id="{80E590DF-0A88-7056-85D1-A8E809E2318F}"/>
+              </a:ext>
+            </a:extLst>
+          </p:cNvPr>
+          <p:cNvSpPr>
+            <a:spLocks noGrp="1"/>
+          </p:cNvSpPr>
+          <p:nvPr>
+            <p:ph type="title"/>
+          </p:nvPr>
+        </p:nvSpPr>
+        <p:spPr>
+          <a:xfrm>
+            <a:off x="831850" y="1709738"/>
+            <a:ext cx="10515600" cy="1837859"/>
+          </a:xfrm>
+        </p:spPr>
+        <p:txBody>
+          <a:bodyPr/>
+          <a:lstStyle/>
+          <a:p>
+            <a:pPr algn="ctr"/>
+            <a:r>
+              <a:rPr lang="fr-FR" dirty="0"/>
+              <a:t>Code </a:t>
+            </a:r>
+            <a:r>
+              <a:rPr lang="fr-FR" dirty="0" err="1"/>
+              <a:t>Review</a:t>
+            </a:r>
+            <a:endParaRPr lang="fr-FR" dirty="0"/>
+          </a:p>
+        </p:txBody>
+      </p:sp>
+      <p:sp>
+        <p:nvSpPr>
+          <p:cNvPr id="5" name="Espace réservé du texte 4">
+            <a:extLst>
+              <a:ext uri="{FF2B5EF4-FFF2-40B4-BE49-F238E27FC236}">
+                <a16:creationId xmlns:a16="http://schemas.microsoft.com/office/drawing/2014/main" id="{64E8BF61-007C-0740-1AA1-06B9449B33C7}"/>
+              </a:ext>
+            </a:extLst>
+          </p:cNvPr>
+          <p:cNvSpPr>
+            <a:spLocks noGrp="1"/>
+          </p:cNvSpPr>
+          <p:nvPr>
+            <p:ph type="body" idx="1"/>
+          </p:nvPr>
+        </p:nvSpPr>
+        <p:spPr/>
+        <p:txBody>
+          <a:bodyPr/>
+          <a:lstStyle/>
+          <a:p>
+            <a:endParaRPr lang="fr-FR"/>
+          </a:p>
+        </p:txBody>
+      </p:sp>
+    </p:spTree>
+    <p:extLst>
+      <p:ext uri="{BB962C8B-B14F-4D97-AF65-F5344CB8AC3E}">
+        <p14:creationId xmlns:p14="http://schemas.microsoft.com/office/powerpoint/2010/main" val="312535264"/>
+      </p:ext>
+    </p:extLst>
+  </p:cSld>
+  <p:clrMapOvr>
+    <a:masterClrMapping/>
+  </p:clrMapOvr>
+</p:sld>
+</file>
+
+<file path=ppt/slides/slide7.xml><?xml version="1.0" encoding="utf-8"?>
 <p:sld xmlns:a="http://schemas.openxmlformats.org/drawingml/2006/main" xmlns:r="http://schemas.openxmlformats.org/officeDocument/2006/relationships" xmlns:p="http://schemas.openxmlformats.org/presentationml/2006/main">
   <p:cSld>
     <p:spTree>

</xml_diff>